<commit_message>
ultima atualização do material da palestra
</commit_message>
<xml_diff>
--- a/DOCs/Apresentacao/Manha/Aula_1_Parte_B_Manha.pptx
+++ b/DOCs/Apresentacao/Manha/Aula_1_Parte_B_Manha.pptx
@@ -6,7 +6,7 @@
     <p:sldMasterId id="2147483658" r:id="rId2"/>
   </p:sldMasterIdLst>
   <p:notesMasterIdLst>
-    <p:notesMasterId r:id="rId13"/>
+    <p:notesMasterId r:id="rId14"/>
   </p:notesMasterIdLst>
   <p:sldIdLst>
     <p:sldId id="256" r:id="rId3"/>
@@ -18,31 +18,32 @@
     <p:sldId id="305" r:id="rId9"/>
     <p:sldId id="307" r:id="rId10"/>
     <p:sldId id="306" r:id="rId11"/>
-    <p:sldId id="331" r:id="rId12"/>
+    <p:sldId id="332" r:id="rId12"/>
+    <p:sldId id="331" r:id="rId13"/>
   </p:sldIdLst>
   <p:sldSz cx="9144000" cy="5143500" type="screen16x9"/>
   <p:notesSz cx="6858000" cy="9144000"/>
   <p:embeddedFontLst>
     <p:embeddedFont>
       <p:font typeface="Arvo" panose="020B0604020202020204" charset="0"/>
-      <p:regular r:id="rId14"/>
-      <p:bold r:id="rId15"/>
-      <p:italic r:id="rId16"/>
-      <p:boldItalic r:id="rId17"/>
+      <p:regular r:id="rId15"/>
+      <p:bold r:id="rId16"/>
+      <p:italic r:id="rId17"/>
+      <p:boldItalic r:id="rId18"/>
     </p:embeddedFont>
     <p:embeddedFont>
       <p:font typeface="Roboto Condensed" panose="02000000000000000000" pitchFamily="2" charset="0"/>
-      <p:regular r:id="rId18"/>
-      <p:bold r:id="rId19"/>
-      <p:italic r:id="rId20"/>
-      <p:boldItalic r:id="rId21"/>
+      <p:regular r:id="rId19"/>
+      <p:bold r:id="rId20"/>
+      <p:italic r:id="rId21"/>
+      <p:boldItalic r:id="rId22"/>
     </p:embeddedFont>
     <p:embeddedFont>
       <p:font typeface="Roboto Condensed Light" panose="02000000000000000000" pitchFamily="2" charset="0"/>
-      <p:regular r:id="rId22"/>
-      <p:bold r:id="rId23"/>
-      <p:italic r:id="rId24"/>
-      <p:boldItalic r:id="rId25"/>
+      <p:regular r:id="rId23"/>
+      <p:bold r:id="rId24"/>
+      <p:italic r:id="rId25"/>
+      <p:boldItalic r:id="rId26"/>
     </p:embeddedFont>
   </p:embeddedFontLst>
   <p:defaultTextStyle>
@@ -828,6 +829,115 @@
 </file>
 
 <file path=ppt/notesSlides/notesSlide10.xml><?xml version="1.0" encoding="utf-8"?>
+<p:notes xmlns:a="http://schemas.openxmlformats.org/drawingml/2006/main" xmlns:r="http://schemas.openxmlformats.org/officeDocument/2006/relationships" xmlns:p="http://schemas.openxmlformats.org/presentationml/2006/main" showMasterSp="0" showMasterPhAnim="0">
+  <p:cSld>
+    <p:spTree>
+      <p:nvGrpSpPr>
+        <p:cNvPr id="1" name="Shape 185"/>
+        <p:cNvGrpSpPr/>
+        <p:nvPr/>
+      </p:nvGrpSpPr>
+      <p:grpSpPr>
+        <a:xfrm>
+          <a:off x="0" y="0"/>
+          <a:ext cx="0" cy="0"/>
+          <a:chOff x="0" y="0"/>
+          <a:chExt cx="0" cy="0"/>
+        </a:xfrm>
+      </p:grpSpPr>
+      <p:sp>
+        <p:nvSpPr>
+          <p:cNvPr id="186" name="Google Shape;186;g3606f1c2d_30:notes"/>
+          <p:cNvSpPr>
+            <a:spLocks noGrp="1" noRot="1" noChangeAspect="1"/>
+          </p:cNvSpPr>
+          <p:nvPr>
+            <p:ph type="sldImg" idx="2"/>
+          </p:nvPr>
+        </p:nvSpPr>
+        <p:spPr>
+          <a:xfrm>
+            <a:off x="381000" y="685800"/>
+            <a:ext cx="6096000" cy="3429000"/>
+          </a:xfrm>
+          <a:custGeom>
+            <a:avLst/>
+            <a:gdLst/>
+            <a:ahLst/>
+            <a:cxnLst/>
+            <a:rect l="l" t="t" r="r" b="b"/>
+            <a:pathLst>
+              <a:path w="120000" h="120000" extrusionOk="0">
+                <a:moveTo>
+                  <a:pt x="0" y="0"/>
+                </a:moveTo>
+                <a:lnTo>
+                  <a:pt x="120000" y="0"/>
+                </a:lnTo>
+                <a:lnTo>
+                  <a:pt x="120000" y="120000"/>
+                </a:lnTo>
+                <a:lnTo>
+                  <a:pt x="0" y="120000"/>
+                </a:lnTo>
+                <a:close/>
+              </a:path>
+            </a:pathLst>
+          </a:custGeom>
+        </p:spPr>
+      </p:sp>
+      <p:sp>
+        <p:nvSpPr>
+          <p:cNvPr id="187" name="Google Shape;187;g3606f1c2d_30:notes"/>
+          <p:cNvSpPr txBox="1">
+            <a:spLocks noGrp="1"/>
+          </p:cNvSpPr>
+          <p:nvPr>
+            <p:ph type="body" idx="1"/>
+          </p:nvPr>
+        </p:nvSpPr>
+        <p:spPr>
+          <a:xfrm>
+            <a:off x="685800" y="4343400"/>
+            <a:ext cx="5486400" cy="4114800"/>
+          </a:xfrm>
+          <a:prstGeom prst="rect">
+            <a:avLst/>
+          </a:prstGeom>
+        </p:spPr>
+        <p:txBody>
+          <a:bodyPr spcFirstLastPara="1" wrap="square" lIns="91425" tIns="91425" rIns="91425" bIns="91425" anchor="t" anchorCtr="0">
+            <a:noAutofit/>
+          </a:bodyPr>
+          <a:lstStyle/>
+          <a:p>
+            <a:pPr marL="0" lvl="0" indent="0" algn="l" rtl="0">
+              <a:spcBef>
+                <a:spcPts val="0"/>
+              </a:spcBef>
+              <a:spcAft>
+                <a:spcPts val="0"/>
+              </a:spcAft>
+              <a:buNone/>
+            </a:pPr>
+            <a:endParaRPr/>
+          </a:p>
+        </p:txBody>
+      </p:sp>
+    </p:spTree>
+    <p:extLst>
+      <p:ext uri="{BB962C8B-B14F-4D97-AF65-F5344CB8AC3E}">
+        <p14:creationId xmlns:p14="http://schemas.microsoft.com/office/powerpoint/2010/main" val="1046212651"/>
+      </p:ext>
+    </p:extLst>
+  </p:cSld>
+  <p:clrMapOvr>
+    <a:masterClrMapping/>
+  </p:clrMapOvr>
+</p:notes>
+</file>
+
+<file path=ppt/notesSlides/notesSlide11.xml><?xml version="1.0" encoding="utf-8"?>
 <p:notes xmlns:a="http://schemas.openxmlformats.org/drawingml/2006/main" xmlns:r="http://schemas.openxmlformats.org/officeDocument/2006/relationships" xmlns:p="http://schemas.openxmlformats.org/presentationml/2006/main">
   <p:cSld>
     <p:spTree>
@@ -910,7 +1020,7 @@
             <a:pPr rtl="0"/>
             <a:fld id="{77542409-6A04-4DC6-AC3A-D3758287A8F2}" type="slidenum">
               <a:rPr lang="pt-BR" noProof="0" smtClean="0"/>
-              <a:t>10</a:t>
+              <a:t>11</a:t>
             </a:fld>
             <a:endParaRPr lang="pt-BR" noProof="0" dirty="0"/>
           </a:p>
@@ -4662,7 +4772,7 @@
             <a:pPr rtl="0"/>
             <a:fld id="{84DDBE4A-42CF-4B09-9FBC-B0B9834A4DCD}" type="datetime1">
               <a:rPr lang="pt-BR" noProof="0" smtClean="0"/>
-              <a:t>12/09/2023</a:t>
+              <a:t>01/10/2023</a:t>
             </a:fld>
             <a:endParaRPr lang="pt-BR" noProof="0" dirty="0"/>
           </a:p>
@@ -13288,68 +13398,6 @@
           </a:ln>
         </p:spPr>
       </p:pic>
-      <p:pic>
-        <p:nvPicPr>
-          <p:cNvPr id="15" name="Picture 2" descr="Image">
-            <a:extLst>
-              <a:ext uri="{FF2B5EF4-FFF2-40B4-BE49-F238E27FC236}">
-                <a16:creationId xmlns:a16="http://schemas.microsoft.com/office/drawing/2014/main" id="{E5951ED4-7951-4F17-A5EA-241D2ABE91CE}"/>
-              </a:ext>
-            </a:extLst>
-          </p:cNvPr>
-          <p:cNvPicPr>
-            <a:picLocks noChangeAspect="1" noChangeArrowheads="1"/>
-          </p:cNvPicPr>
-          <p:nvPr/>
-        </p:nvPicPr>
-        <p:blipFill>
-          <a:blip r:embed="rId9" cstate="print"/>
-          <a:srcRect/>
-          <a:stretch>
-            <a:fillRect/>
-          </a:stretch>
-        </p:blipFill>
-        <p:spPr bwMode="auto">
-          <a:xfrm>
-            <a:off x="1" y="-8022"/>
-            <a:ext cx="863600" cy="695850"/>
-          </a:xfrm>
-          <a:prstGeom prst="rect">
-            <a:avLst/>
-          </a:prstGeom>
-          <a:noFill/>
-        </p:spPr>
-      </p:pic>
-      <p:pic>
-        <p:nvPicPr>
-          <p:cNvPr id="16" name="Picture 12" descr="Resultado de imagem para MOCEAN INPE">
-            <a:extLst>
-              <a:ext uri="{FF2B5EF4-FFF2-40B4-BE49-F238E27FC236}">
-                <a16:creationId xmlns:a16="http://schemas.microsoft.com/office/drawing/2014/main" id="{F061A742-8B47-4D51-AD38-975EC503DF86}"/>
-              </a:ext>
-            </a:extLst>
-          </p:cNvPr>
-          <p:cNvPicPr>
-            <a:picLocks noChangeAspect="1" noChangeArrowheads="1"/>
-          </p:cNvPicPr>
-          <p:nvPr/>
-        </p:nvPicPr>
-        <p:blipFill rotWithShape="1">
-          <a:blip r:embed="rId10" cstate="print"/>
-          <a:srcRect l="6141" r="6299"/>
-          <a:stretch/>
-        </p:blipFill>
-        <p:spPr bwMode="auto">
-          <a:xfrm>
-            <a:off x="8135257" y="0"/>
-            <a:ext cx="1008743" cy="695850"/>
-          </a:xfrm>
-          <a:prstGeom prst="rect">
-            <a:avLst/>
-          </a:prstGeom>
-          <a:noFill/>
-        </p:spPr>
-      </p:pic>
       <p:sp>
         <p:nvSpPr>
           <p:cNvPr id="17" name="Google Shape;193;p12">
@@ -13681,12 +13729,1758 @@
           </a:p>
         </p:txBody>
       </p:sp>
+    </p:spTree>
+  </p:cSld>
+  <p:clrMapOvr>
+    <a:masterClrMapping/>
+  </p:clrMapOvr>
+</p:sld>
+</file>
+
+<file path=ppt/slides/slide10.xml><?xml version="1.0" encoding="utf-8"?>
+<p:sld xmlns:a="http://schemas.openxmlformats.org/drawingml/2006/main" xmlns:r="http://schemas.openxmlformats.org/officeDocument/2006/relationships" xmlns:p="http://schemas.openxmlformats.org/presentationml/2006/main">
+  <p:cSld>
+    <p:spTree>
+      <p:nvGrpSpPr>
+        <p:cNvPr id="1" name="Shape 188"/>
+        <p:cNvGrpSpPr/>
+        <p:nvPr/>
+      </p:nvGrpSpPr>
+      <p:grpSpPr>
+        <a:xfrm>
+          <a:off x="0" y="0"/>
+          <a:ext cx="0" cy="0"/>
+          <a:chOff x="0" y="0"/>
+          <a:chExt cx="0" cy="0"/>
+        </a:xfrm>
+      </p:grpSpPr>
+      <p:sp>
+        <p:nvSpPr>
+          <p:cNvPr id="5" name="Espaço Reservado para Texto 4">
+            <a:extLst>
+              <a:ext uri="{FF2B5EF4-FFF2-40B4-BE49-F238E27FC236}">
+                <a16:creationId xmlns:a16="http://schemas.microsoft.com/office/drawing/2014/main" id="{B8C818B0-B377-41AB-A053-8BDC31F9EE70}"/>
+              </a:ext>
+            </a:extLst>
+          </p:cNvPr>
+          <p:cNvSpPr>
+            <a:spLocks noGrp="1"/>
+          </p:cNvSpPr>
+          <p:nvPr>
+            <p:ph type="body" idx="2"/>
+          </p:nvPr>
+        </p:nvSpPr>
+        <p:spPr>
+          <a:xfrm>
+            <a:off x="4142792" y="1472120"/>
+            <a:ext cx="4164629" cy="3527898"/>
+          </a:xfrm>
+        </p:spPr>
+        <p:txBody>
+          <a:bodyPr/>
+          <a:lstStyle/>
+          <a:p>
+            <a:pPr>
+              <a:lnSpc>
+                <a:spcPct val="150000"/>
+              </a:lnSpc>
+            </a:pPr>
+            <a:r>
+              <a:rPr lang="pt-BR" sz="1600" dirty="0">
+                <a:solidFill>
+                  <a:srgbClr val="3F5378"/>
+                </a:solidFill>
+                <a:latin typeface="+mj-lt"/>
+                <a:hlinkClick r:id="rId3">
+                  <a:extLst>
+                    <a:ext uri="{A12FA001-AC4F-418D-AE19-62706E023703}">
+                      <ahyp:hlinkClr xmlns:ahyp="http://schemas.microsoft.com/office/drawing/2018/hyperlinkcolor" val="tx"/>
+                    </a:ext>
+                  </a:extLst>
+                </a:hlinkClick>
+              </a:rPr>
+              <a:t>Download </a:t>
+            </a:r>
+            <a:r>
+              <a:rPr lang="pt-BR" sz="1600" dirty="0">
+                <a:solidFill>
+                  <a:schemeClr val="tx1"/>
+                </a:solidFill>
+                <a:latin typeface="+mj-lt"/>
+                <a:hlinkClick r:id="rId3">
+                  <a:extLst>
+                    <a:ext uri="{A12FA001-AC4F-418D-AE19-62706E023703}">
+                      <ahyp:hlinkClr xmlns:ahyp="http://schemas.microsoft.com/office/drawing/2018/hyperlinkcolor" val="tx"/>
+                    </a:ext>
+                  </a:extLst>
+                </a:hlinkClick>
+              </a:rPr>
+              <a:t>de Dados IBGE</a:t>
+            </a:r>
+            <a:endParaRPr lang="pt-BR" sz="1600" dirty="0">
+              <a:solidFill>
+                <a:schemeClr val="tx1"/>
+              </a:solidFill>
+              <a:latin typeface="+mj-lt"/>
+            </a:endParaRPr>
+          </a:p>
+          <a:p>
+            <a:pPr>
+              <a:lnSpc>
+                <a:spcPct val="150000"/>
+              </a:lnSpc>
+            </a:pPr>
+            <a:r>
+              <a:rPr lang="pt-BR" sz="1600" dirty="0" err="1">
+                <a:solidFill>
+                  <a:schemeClr val="tx1"/>
+                </a:solidFill>
+                <a:latin typeface="+mj-lt"/>
+                <a:hlinkClick r:id="rId4"/>
+              </a:rPr>
+              <a:t>Geocodifcação</a:t>
+            </a:r>
+            <a:endParaRPr lang="pt-BR" sz="1600" dirty="0">
+              <a:solidFill>
+                <a:schemeClr val="tx1"/>
+              </a:solidFill>
+              <a:latin typeface="+mj-lt"/>
+            </a:endParaRPr>
+          </a:p>
+          <a:p>
+            <a:pPr>
+              <a:lnSpc>
+                <a:spcPct val="150000"/>
+              </a:lnSpc>
+            </a:pPr>
+            <a:r>
+              <a:rPr lang="pt-BR" sz="1600" dirty="0">
+                <a:solidFill>
+                  <a:schemeClr val="tx1"/>
+                </a:solidFill>
+                <a:latin typeface="+mj-lt"/>
+              </a:rPr>
+              <a:t>Dados de satélite</a:t>
+            </a:r>
+          </a:p>
+          <a:p>
+            <a:pPr lvl="1">
+              <a:lnSpc>
+                <a:spcPct val="150000"/>
+              </a:lnSpc>
+            </a:pPr>
+            <a:r>
+              <a:rPr lang="pt-BR" sz="1600" dirty="0">
+                <a:solidFill>
+                  <a:schemeClr val="tx1"/>
+                </a:solidFill>
+                <a:latin typeface="+mj-lt"/>
+                <a:hlinkClick r:id="rId5"/>
+              </a:rPr>
+              <a:t>Representações Matriciais</a:t>
+            </a:r>
+            <a:endParaRPr lang="pt-BR" sz="1600" dirty="0">
+              <a:solidFill>
+                <a:schemeClr val="tx1"/>
+              </a:solidFill>
+              <a:latin typeface="+mj-lt"/>
+            </a:endParaRPr>
+          </a:p>
+          <a:p>
+            <a:pPr lvl="1">
+              <a:lnSpc>
+                <a:spcPct val="150000"/>
+              </a:lnSpc>
+            </a:pPr>
+            <a:r>
+              <a:rPr lang="pt-BR" sz="1600" dirty="0">
+                <a:solidFill>
+                  <a:schemeClr val="tx1"/>
+                </a:solidFill>
+                <a:latin typeface="+mj-lt"/>
+                <a:hlinkClick r:id="rId6"/>
+              </a:rPr>
+              <a:t>Dados de </a:t>
+            </a:r>
+            <a:r>
+              <a:rPr lang="pt-BR" sz="1600" dirty="0" err="1">
+                <a:solidFill>
+                  <a:schemeClr val="tx1"/>
+                </a:solidFill>
+                <a:latin typeface="+mj-lt"/>
+                <a:hlinkClick r:id="rId6"/>
+              </a:rPr>
+              <a:t>SR</a:t>
+            </a:r>
+            <a:endParaRPr lang="pt-BR" sz="1600" dirty="0">
+              <a:solidFill>
+                <a:schemeClr val="tx1"/>
+              </a:solidFill>
+              <a:latin typeface="+mj-lt"/>
+            </a:endParaRPr>
+          </a:p>
+        </p:txBody>
+      </p:sp>
+      <p:sp>
+        <p:nvSpPr>
+          <p:cNvPr id="189" name="Google Shape;189;p12"/>
+          <p:cNvSpPr txBox="1">
+            <a:spLocks noGrp="1"/>
+          </p:cNvSpPr>
+          <p:nvPr>
+            <p:ph type="title"/>
+          </p:nvPr>
+        </p:nvSpPr>
+        <p:spPr>
+          <a:xfrm>
+            <a:off x="814275" y="392575"/>
+            <a:ext cx="5258400" cy="766200"/>
+          </a:xfrm>
+          <a:prstGeom prst="rect">
+            <a:avLst/>
+          </a:prstGeom>
+        </p:spPr>
+        <p:txBody>
+          <a:bodyPr spcFirstLastPara="1" wrap="square" lIns="91425" tIns="91425" rIns="91425" bIns="91425" anchor="ctr" anchorCtr="0">
+            <a:noAutofit/>
+          </a:bodyPr>
+          <a:lstStyle/>
+          <a:p>
+            <a:pPr marL="0" lvl="0" indent="0" algn="l" rtl="0">
+              <a:spcBef>
+                <a:spcPts val="0"/>
+              </a:spcBef>
+              <a:spcAft>
+                <a:spcPts val="0"/>
+              </a:spcAft>
+              <a:buNone/>
+            </a:pPr>
+            <a:r>
+              <a:rPr lang="en" dirty="0"/>
+              <a:t>PARTE PRÁTICA</a:t>
+            </a:r>
+            <a:endParaRPr dirty="0"/>
+          </a:p>
+        </p:txBody>
+      </p:sp>
+      <p:sp>
+        <p:nvSpPr>
+          <p:cNvPr id="192" name="Google Shape;192;p12"/>
+          <p:cNvSpPr txBox="1">
+            <a:spLocks noGrp="1"/>
+          </p:cNvSpPr>
+          <p:nvPr>
+            <p:ph type="sldNum" idx="12"/>
+          </p:nvPr>
+        </p:nvSpPr>
+        <p:spPr>
+          <a:xfrm>
+            <a:off x="7618000" y="4636500"/>
+            <a:ext cx="1487400" cy="315600"/>
+          </a:xfrm>
+          <a:prstGeom prst="rect">
+            <a:avLst/>
+          </a:prstGeom>
+        </p:spPr>
+        <p:txBody>
+          <a:bodyPr spcFirstLastPara="1" wrap="square" lIns="91425" tIns="91425" rIns="91425" bIns="91425" anchor="ctr" anchorCtr="0">
+            <a:noAutofit/>
+          </a:bodyPr>
+          <a:lstStyle/>
+          <a:p>
+            <a:pPr marL="0" lvl="0" indent="0" algn="r" rtl="0">
+              <a:spcBef>
+                <a:spcPts val="0"/>
+              </a:spcBef>
+              <a:spcAft>
+                <a:spcPts val="0"/>
+              </a:spcAft>
+              <a:buNone/>
+            </a:pPr>
+            <a:fld id="{00000000-1234-1234-1234-123412341234}" type="slidenum">
+              <a:rPr lang="en"/>
+              <a:t>10</a:t>
+            </a:fld>
+            <a:endParaRPr/>
+          </a:p>
+        </p:txBody>
+      </p:sp>
+      <p:grpSp>
+        <p:nvGrpSpPr>
+          <p:cNvPr id="194" name="Google Shape;194;p12"/>
+          <p:cNvGrpSpPr/>
+          <p:nvPr/>
+        </p:nvGrpSpPr>
+        <p:grpSpPr>
+          <a:xfrm>
+            <a:off x="293683" y="574116"/>
+            <a:ext cx="309041" cy="403123"/>
+            <a:chOff x="590250" y="244200"/>
+            <a:chExt cx="407975" cy="532175"/>
+          </a:xfrm>
+        </p:grpSpPr>
+        <p:sp>
+          <p:nvSpPr>
+            <p:cNvPr id="195" name="Google Shape;195;p12"/>
+            <p:cNvSpPr/>
+            <p:nvPr/>
+          </p:nvSpPr>
+          <p:spPr>
+            <a:xfrm>
+              <a:off x="623125" y="313625"/>
+              <a:ext cx="375100" cy="462750"/>
+            </a:xfrm>
+            <a:custGeom>
+              <a:avLst/>
+              <a:gdLst/>
+              <a:ahLst/>
+              <a:cxnLst/>
+              <a:rect l="l" t="t" r="r" b="b"/>
+              <a:pathLst>
+                <a:path w="15004" h="18510" fill="none" extrusionOk="0">
+                  <a:moveTo>
+                    <a:pt x="1" y="17536"/>
+                  </a:moveTo>
+                  <a:lnTo>
+                    <a:pt x="1" y="17536"/>
+                  </a:lnTo>
+                  <a:lnTo>
+                    <a:pt x="1" y="17536"/>
+                  </a:lnTo>
+                  <a:lnTo>
+                    <a:pt x="25" y="17682"/>
+                  </a:lnTo>
+                  <a:lnTo>
+                    <a:pt x="49" y="17852"/>
+                  </a:lnTo>
+                  <a:lnTo>
+                    <a:pt x="123" y="18023"/>
+                  </a:lnTo>
+                  <a:lnTo>
+                    <a:pt x="220" y="18193"/>
+                  </a:lnTo>
+                  <a:lnTo>
+                    <a:pt x="293" y="18291"/>
+                  </a:lnTo>
+                  <a:lnTo>
+                    <a:pt x="390" y="18364"/>
+                  </a:lnTo>
+                  <a:lnTo>
+                    <a:pt x="488" y="18412"/>
+                  </a:lnTo>
+                  <a:lnTo>
+                    <a:pt x="610" y="18461"/>
+                  </a:lnTo>
+                  <a:lnTo>
+                    <a:pt x="756" y="18510"/>
+                  </a:lnTo>
+                  <a:lnTo>
+                    <a:pt x="926" y="18510"/>
+                  </a:lnTo>
+                  <a:lnTo>
+                    <a:pt x="14468" y="18510"/>
+                  </a:lnTo>
+                  <a:lnTo>
+                    <a:pt x="14468" y="18510"/>
+                  </a:lnTo>
+                  <a:lnTo>
+                    <a:pt x="14541" y="18510"/>
+                  </a:lnTo>
+                  <a:lnTo>
+                    <a:pt x="14614" y="18485"/>
+                  </a:lnTo>
+                  <a:lnTo>
+                    <a:pt x="14736" y="18412"/>
+                  </a:lnTo>
+                  <a:lnTo>
+                    <a:pt x="14833" y="18291"/>
+                  </a:lnTo>
+                  <a:lnTo>
+                    <a:pt x="14906" y="18144"/>
+                  </a:lnTo>
+                  <a:lnTo>
+                    <a:pt x="14955" y="17974"/>
+                  </a:lnTo>
+                  <a:lnTo>
+                    <a:pt x="14979" y="17779"/>
+                  </a:lnTo>
+                  <a:lnTo>
+                    <a:pt x="15003" y="17438"/>
+                  </a:lnTo>
+                  <a:lnTo>
+                    <a:pt x="15003" y="487"/>
+                  </a:lnTo>
+                  <a:lnTo>
+                    <a:pt x="15003" y="487"/>
+                  </a:lnTo>
+                  <a:lnTo>
+                    <a:pt x="15003" y="341"/>
+                  </a:lnTo>
+                  <a:lnTo>
+                    <a:pt x="14979" y="219"/>
+                  </a:lnTo>
+                  <a:lnTo>
+                    <a:pt x="14955" y="146"/>
+                  </a:lnTo>
+                  <a:lnTo>
+                    <a:pt x="14906" y="73"/>
+                  </a:lnTo>
+                  <a:lnTo>
+                    <a:pt x="14833" y="49"/>
+                  </a:lnTo>
+                  <a:lnTo>
+                    <a:pt x="14736" y="24"/>
+                  </a:lnTo>
+                  <a:lnTo>
+                    <a:pt x="14468" y="0"/>
+                  </a:lnTo>
+                </a:path>
+              </a:pathLst>
+            </a:custGeom>
+            <a:noFill/>
+            <a:ln w="12175" cap="rnd" cmpd="sng">
+              <a:solidFill>
+                <a:srgbClr val="FF9800"/>
+              </a:solidFill>
+              <a:prstDash val="solid"/>
+              <a:round/>
+              <a:headEnd type="none" w="sm" len="sm"/>
+              <a:tailEnd type="none" w="sm" len="sm"/>
+            </a:ln>
+          </p:spPr>
+          <p:txBody>
+            <a:bodyPr spcFirstLastPara="1" wrap="square" lIns="91425" tIns="91425" rIns="91425" bIns="91425" anchor="ctr" anchorCtr="0">
+              <a:noAutofit/>
+            </a:bodyPr>
+            <a:lstStyle/>
+            <a:p>
+              <a:pPr marL="0" lvl="0" indent="0" algn="l" rtl="0">
+                <a:spcBef>
+                  <a:spcPts val="0"/>
+                </a:spcBef>
+                <a:spcAft>
+                  <a:spcPts val="0"/>
+                </a:spcAft>
+                <a:buNone/>
+              </a:pPr>
+              <a:endParaRPr/>
+            </a:p>
+          </p:txBody>
+        </p:sp>
+        <p:sp>
+          <p:nvSpPr>
+            <p:cNvPr id="196" name="Google Shape;196;p12"/>
+            <p:cNvSpPr/>
+            <p:nvPr/>
+          </p:nvSpPr>
+          <p:spPr>
+            <a:xfrm>
+              <a:off x="590250" y="269775"/>
+              <a:ext cx="377525" cy="462775"/>
+            </a:xfrm>
+            <a:custGeom>
+              <a:avLst/>
+              <a:gdLst/>
+              <a:ahLst/>
+              <a:cxnLst/>
+              <a:rect l="l" t="t" r="r" b="b"/>
+              <a:pathLst>
+                <a:path w="15101" h="18511" fill="none" extrusionOk="0">
+                  <a:moveTo>
+                    <a:pt x="14321" y="0"/>
+                  </a:moveTo>
+                  <a:lnTo>
+                    <a:pt x="780" y="0"/>
+                  </a:lnTo>
+                  <a:lnTo>
+                    <a:pt x="780" y="0"/>
+                  </a:lnTo>
+                  <a:lnTo>
+                    <a:pt x="634" y="25"/>
+                  </a:lnTo>
+                  <a:lnTo>
+                    <a:pt x="488" y="74"/>
+                  </a:lnTo>
+                  <a:lnTo>
+                    <a:pt x="342" y="122"/>
+                  </a:lnTo>
+                  <a:lnTo>
+                    <a:pt x="220" y="220"/>
+                  </a:lnTo>
+                  <a:lnTo>
+                    <a:pt x="122" y="341"/>
+                  </a:lnTo>
+                  <a:lnTo>
+                    <a:pt x="74" y="488"/>
+                  </a:lnTo>
+                  <a:lnTo>
+                    <a:pt x="25" y="634"/>
+                  </a:lnTo>
+                  <a:lnTo>
+                    <a:pt x="1" y="780"/>
+                  </a:lnTo>
+                  <a:lnTo>
+                    <a:pt x="1" y="17731"/>
+                  </a:lnTo>
+                  <a:lnTo>
+                    <a:pt x="1" y="17731"/>
+                  </a:lnTo>
+                  <a:lnTo>
+                    <a:pt x="25" y="17877"/>
+                  </a:lnTo>
+                  <a:lnTo>
+                    <a:pt x="74" y="18023"/>
+                  </a:lnTo>
+                  <a:lnTo>
+                    <a:pt x="122" y="18169"/>
+                  </a:lnTo>
+                  <a:lnTo>
+                    <a:pt x="220" y="18291"/>
+                  </a:lnTo>
+                  <a:lnTo>
+                    <a:pt x="342" y="18388"/>
+                  </a:lnTo>
+                  <a:lnTo>
+                    <a:pt x="488" y="18437"/>
+                  </a:lnTo>
+                  <a:lnTo>
+                    <a:pt x="634" y="18486"/>
+                  </a:lnTo>
+                  <a:lnTo>
+                    <a:pt x="780" y="18510"/>
+                  </a:lnTo>
+                  <a:lnTo>
+                    <a:pt x="14321" y="18510"/>
+                  </a:lnTo>
+                  <a:lnTo>
+                    <a:pt x="14321" y="18510"/>
+                  </a:lnTo>
+                  <a:lnTo>
+                    <a:pt x="14467" y="18486"/>
+                  </a:lnTo>
+                  <a:lnTo>
+                    <a:pt x="14614" y="18437"/>
+                  </a:lnTo>
+                  <a:lnTo>
+                    <a:pt x="14760" y="18388"/>
+                  </a:lnTo>
+                  <a:lnTo>
+                    <a:pt x="14881" y="18291"/>
+                  </a:lnTo>
+                  <a:lnTo>
+                    <a:pt x="14979" y="18169"/>
+                  </a:lnTo>
+                  <a:lnTo>
+                    <a:pt x="15028" y="18023"/>
+                  </a:lnTo>
+                  <a:lnTo>
+                    <a:pt x="15076" y="17877"/>
+                  </a:lnTo>
+                  <a:lnTo>
+                    <a:pt x="15101" y="17731"/>
+                  </a:lnTo>
+                  <a:lnTo>
+                    <a:pt x="15101" y="780"/>
+                  </a:lnTo>
+                  <a:lnTo>
+                    <a:pt x="15101" y="780"/>
+                  </a:lnTo>
+                  <a:lnTo>
+                    <a:pt x="15076" y="634"/>
+                  </a:lnTo>
+                  <a:lnTo>
+                    <a:pt x="15028" y="488"/>
+                  </a:lnTo>
+                  <a:lnTo>
+                    <a:pt x="14979" y="341"/>
+                  </a:lnTo>
+                  <a:lnTo>
+                    <a:pt x="14881" y="220"/>
+                  </a:lnTo>
+                  <a:lnTo>
+                    <a:pt x="14760" y="122"/>
+                  </a:lnTo>
+                  <a:lnTo>
+                    <a:pt x="14614" y="74"/>
+                  </a:lnTo>
+                  <a:lnTo>
+                    <a:pt x="14467" y="25"/>
+                  </a:lnTo>
+                  <a:lnTo>
+                    <a:pt x="14321" y="0"/>
+                  </a:lnTo>
+                  <a:lnTo>
+                    <a:pt x="14321" y="0"/>
+                  </a:lnTo>
+                </a:path>
+              </a:pathLst>
+            </a:custGeom>
+            <a:noFill/>
+            <a:ln w="12175" cap="rnd" cmpd="sng">
+              <a:solidFill>
+                <a:srgbClr val="FF9800"/>
+              </a:solidFill>
+              <a:prstDash val="solid"/>
+              <a:round/>
+              <a:headEnd type="none" w="sm" len="sm"/>
+              <a:tailEnd type="none" w="sm" len="sm"/>
+            </a:ln>
+          </p:spPr>
+          <p:txBody>
+            <a:bodyPr spcFirstLastPara="1" wrap="square" lIns="91425" tIns="91425" rIns="91425" bIns="91425" anchor="ctr" anchorCtr="0">
+              <a:noAutofit/>
+            </a:bodyPr>
+            <a:lstStyle/>
+            <a:p>
+              <a:pPr marL="0" lvl="0" indent="0" algn="l" rtl="0">
+                <a:spcBef>
+                  <a:spcPts val="0"/>
+                </a:spcBef>
+                <a:spcAft>
+                  <a:spcPts val="0"/>
+                </a:spcAft>
+                <a:buNone/>
+              </a:pPr>
+              <a:endParaRPr/>
+            </a:p>
+          </p:txBody>
+        </p:sp>
+        <p:sp>
+          <p:nvSpPr>
+            <p:cNvPr id="197" name="Google Shape;197;p12"/>
+            <p:cNvSpPr/>
+            <p:nvPr/>
+          </p:nvSpPr>
+          <p:spPr>
+            <a:xfrm>
+              <a:off x="796650" y="274025"/>
+              <a:ext cx="45100" cy="45100"/>
+            </a:xfrm>
+            <a:custGeom>
+              <a:avLst/>
+              <a:gdLst/>
+              <a:ahLst/>
+              <a:cxnLst/>
+              <a:rect l="l" t="t" r="r" b="b"/>
+              <a:pathLst>
+                <a:path w="1804" h="1804" fill="none" extrusionOk="0">
+                  <a:moveTo>
+                    <a:pt x="902" y="1"/>
+                  </a:moveTo>
+                  <a:lnTo>
+                    <a:pt x="902" y="1"/>
+                  </a:lnTo>
+                  <a:lnTo>
+                    <a:pt x="1073" y="25"/>
+                  </a:lnTo>
+                  <a:lnTo>
+                    <a:pt x="1243" y="74"/>
+                  </a:lnTo>
+                  <a:lnTo>
+                    <a:pt x="1414" y="147"/>
+                  </a:lnTo>
+                  <a:lnTo>
+                    <a:pt x="1535" y="269"/>
+                  </a:lnTo>
+                  <a:lnTo>
+                    <a:pt x="1657" y="391"/>
+                  </a:lnTo>
+                  <a:lnTo>
+                    <a:pt x="1730" y="561"/>
+                  </a:lnTo>
+                  <a:lnTo>
+                    <a:pt x="1779" y="732"/>
+                  </a:lnTo>
+                  <a:lnTo>
+                    <a:pt x="1803" y="902"/>
+                  </a:lnTo>
+                  <a:lnTo>
+                    <a:pt x="1803" y="902"/>
+                  </a:lnTo>
+                  <a:lnTo>
+                    <a:pt x="1779" y="1073"/>
+                  </a:lnTo>
+                  <a:lnTo>
+                    <a:pt x="1730" y="1243"/>
+                  </a:lnTo>
+                  <a:lnTo>
+                    <a:pt x="1657" y="1414"/>
+                  </a:lnTo>
+                  <a:lnTo>
+                    <a:pt x="1535" y="1535"/>
+                  </a:lnTo>
+                  <a:lnTo>
+                    <a:pt x="1414" y="1657"/>
+                  </a:lnTo>
+                  <a:lnTo>
+                    <a:pt x="1243" y="1730"/>
+                  </a:lnTo>
+                  <a:lnTo>
+                    <a:pt x="1073" y="1779"/>
+                  </a:lnTo>
+                  <a:lnTo>
+                    <a:pt x="902" y="1803"/>
+                  </a:lnTo>
+                  <a:lnTo>
+                    <a:pt x="902" y="1803"/>
+                  </a:lnTo>
+                  <a:lnTo>
+                    <a:pt x="732" y="1779"/>
+                  </a:lnTo>
+                  <a:lnTo>
+                    <a:pt x="561" y="1730"/>
+                  </a:lnTo>
+                  <a:lnTo>
+                    <a:pt x="391" y="1657"/>
+                  </a:lnTo>
+                  <a:lnTo>
+                    <a:pt x="269" y="1535"/>
+                  </a:lnTo>
+                  <a:lnTo>
+                    <a:pt x="147" y="1414"/>
+                  </a:lnTo>
+                  <a:lnTo>
+                    <a:pt x="74" y="1243"/>
+                  </a:lnTo>
+                  <a:lnTo>
+                    <a:pt x="25" y="1073"/>
+                  </a:lnTo>
+                  <a:lnTo>
+                    <a:pt x="1" y="902"/>
+                  </a:lnTo>
+                  <a:lnTo>
+                    <a:pt x="1" y="902"/>
+                  </a:lnTo>
+                  <a:lnTo>
+                    <a:pt x="25" y="732"/>
+                  </a:lnTo>
+                  <a:lnTo>
+                    <a:pt x="74" y="561"/>
+                  </a:lnTo>
+                  <a:lnTo>
+                    <a:pt x="147" y="391"/>
+                  </a:lnTo>
+                  <a:lnTo>
+                    <a:pt x="269" y="269"/>
+                  </a:lnTo>
+                  <a:lnTo>
+                    <a:pt x="391" y="147"/>
+                  </a:lnTo>
+                  <a:lnTo>
+                    <a:pt x="561" y="74"/>
+                  </a:lnTo>
+                  <a:lnTo>
+                    <a:pt x="732" y="25"/>
+                  </a:lnTo>
+                  <a:lnTo>
+                    <a:pt x="902" y="1"/>
+                  </a:lnTo>
+                  <a:lnTo>
+                    <a:pt x="902" y="1"/>
+                  </a:lnTo>
+                </a:path>
+              </a:pathLst>
+            </a:custGeom>
+            <a:noFill/>
+            <a:ln w="12175" cap="rnd" cmpd="sng">
+              <a:solidFill>
+                <a:srgbClr val="FF9800"/>
+              </a:solidFill>
+              <a:prstDash val="solid"/>
+              <a:round/>
+              <a:headEnd type="none" w="sm" len="sm"/>
+              <a:tailEnd type="none" w="sm" len="sm"/>
+            </a:ln>
+          </p:spPr>
+          <p:txBody>
+            <a:bodyPr spcFirstLastPara="1" wrap="square" lIns="91425" tIns="91425" rIns="91425" bIns="91425" anchor="ctr" anchorCtr="0">
+              <a:noAutofit/>
+            </a:bodyPr>
+            <a:lstStyle/>
+            <a:p>
+              <a:pPr marL="0" lvl="0" indent="0" algn="l" rtl="0">
+                <a:spcBef>
+                  <a:spcPts val="0"/>
+                </a:spcBef>
+                <a:spcAft>
+                  <a:spcPts val="0"/>
+                </a:spcAft>
+                <a:buNone/>
+              </a:pPr>
+              <a:endParaRPr/>
+            </a:p>
+          </p:txBody>
+        </p:sp>
+        <p:sp>
+          <p:nvSpPr>
+            <p:cNvPr id="198" name="Google Shape;198;p12"/>
+            <p:cNvSpPr/>
+            <p:nvPr/>
+          </p:nvSpPr>
+          <p:spPr>
+            <a:xfrm>
+              <a:off x="713850" y="274025"/>
+              <a:ext cx="45075" cy="45100"/>
+            </a:xfrm>
+            <a:custGeom>
+              <a:avLst/>
+              <a:gdLst/>
+              <a:ahLst/>
+              <a:cxnLst/>
+              <a:rect l="l" t="t" r="r" b="b"/>
+              <a:pathLst>
+                <a:path w="1803" h="1804" fill="none" extrusionOk="0">
+                  <a:moveTo>
+                    <a:pt x="902" y="1"/>
+                  </a:moveTo>
+                  <a:lnTo>
+                    <a:pt x="902" y="1"/>
+                  </a:lnTo>
+                  <a:lnTo>
+                    <a:pt x="1072" y="25"/>
+                  </a:lnTo>
+                  <a:lnTo>
+                    <a:pt x="1243" y="74"/>
+                  </a:lnTo>
+                  <a:lnTo>
+                    <a:pt x="1413" y="147"/>
+                  </a:lnTo>
+                  <a:lnTo>
+                    <a:pt x="1535" y="269"/>
+                  </a:lnTo>
+                  <a:lnTo>
+                    <a:pt x="1657" y="391"/>
+                  </a:lnTo>
+                  <a:lnTo>
+                    <a:pt x="1730" y="561"/>
+                  </a:lnTo>
+                  <a:lnTo>
+                    <a:pt x="1779" y="732"/>
+                  </a:lnTo>
+                  <a:lnTo>
+                    <a:pt x="1803" y="902"/>
+                  </a:lnTo>
+                  <a:lnTo>
+                    <a:pt x="1803" y="902"/>
+                  </a:lnTo>
+                  <a:lnTo>
+                    <a:pt x="1779" y="1073"/>
+                  </a:lnTo>
+                  <a:lnTo>
+                    <a:pt x="1730" y="1243"/>
+                  </a:lnTo>
+                  <a:lnTo>
+                    <a:pt x="1657" y="1414"/>
+                  </a:lnTo>
+                  <a:lnTo>
+                    <a:pt x="1535" y="1535"/>
+                  </a:lnTo>
+                  <a:lnTo>
+                    <a:pt x="1413" y="1657"/>
+                  </a:lnTo>
+                  <a:lnTo>
+                    <a:pt x="1243" y="1730"/>
+                  </a:lnTo>
+                  <a:lnTo>
+                    <a:pt x="1072" y="1779"/>
+                  </a:lnTo>
+                  <a:lnTo>
+                    <a:pt x="902" y="1803"/>
+                  </a:lnTo>
+                  <a:lnTo>
+                    <a:pt x="902" y="1803"/>
+                  </a:lnTo>
+                  <a:lnTo>
+                    <a:pt x="731" y="1779"/>
+                  </a:lnTo>
+                  <a:lnTo>
+                    <a:pt x="561" y="1730"/>
+                  </a:lnTo>
+                  <a:lnTo>
+                    <a:pt x="390" y="1657"/>
+                  </a:lnTo>
+                  <a:lnTo>
+                    <a:pt x="269" y="1535"/>
+                  </a:lnTo>
+                  <a:lnTo>
+                    <a:pt x="147" y="1414"/>
+                  </a:lnTo>
+                  <a:lnTo>
+                    <a:pt x="74" y="1243"/>
+                  </a:lnTo>
+                  <a:lnTo>
+                    <a:pt x="25" y="1073"/>
+                  </a:lnTo>
+                  <a:lnTo>
+                    <a:pt x="1" y="902"/>
+                  </a:lnTo>
+                  <a:lnTo>
+                    <a:pt x="1" y="902"/>
+                  </a:lnTo>
+                  <a:lnTo>
+                    <a:pt x="25" y="732"/>
+                  </a:lnTo>
+                  <a:lnTo>
+                    <a:pt x="74" y="561"/>
+                  </a:lnTo>
+                  <a:lnTo>
+                    <a:pt x="147" y="391"/>
+                  </a:lnTo>
+                  <a:lnTo>
+                    <a:pt x="269" y="269"/>
+                  </a:lnTo>
+                  <a:lnTo>
+                    <a:pt x="390" y="147"/>
+                  </a:lnTo>
+                  <a:lnTo>
+                    <a:pt x="561" y="74"/>
+                  </a:lnTo>
+                  <a:lnTo>
+                    <a:pt x="731" y="25"/>
+                  </a:lnTo>
+                  <a:lnTo>
+                    <a:pt x="902" y="1"/>
+                  </a:lnTo>
+                  <a:lnTo>
+                    <a:pt x="902" y="1"/>
+                  </a:lnTo>
+                </a:path>
+              </a:pathLst>
+            </a:custGeom>
+            <a:noFill/>
+            <a:ln w="12175" cap="rnd" cmpd="sng">
+              <a:solidFill>
+                <a:srgbClr val="FF9800"/>
+              </a:solidFill>
+              <a:prstDash val="solid"/>
+              <a:round/>
+              <a:headEnd type="none" w="sm" len="sm"/>
+              <a:tailEnd type="none" w="sm" len="sm"/>
+            </a:ln>
+          </p:spPr>
+          <p:txBody>
+            <a:bodyPr spcFirstLastPara="1" wrap="square" lIns="91425" tIns="91425" rIns="91425" bIns="91425" anchor="ctr" anchorCtr="0">
+              <a:noAutofit/>
+            </a:bodyPr>
+            <a:lstStyle/>
+            <a:p>
+              <a:pPr marL="0" lvl="0" indent="0" algn="l" rtl="0">
+                <a:spcBef>
+                  <a:spcPts val="0"/>
+                </a:spcBef>
+                <a:spcAft>
+                  <a:spcPts val="0"/>
+                </a:spcAft>
+                <a:buNone/>
+              </a:pPr>
+              <a:endParaRPr/>
+            </a:p>
+          </p:txBody>
+        </p:sp>
+        <p:sp>
+          <p:nvSpPr>
+            <p:cNvPr id="199" name="Google Shape;199;p12"/>
+            <p:cNvSpPr/>
+            <p:nvPr/>
+          </p:nvSpPr>
+          <p:spPr>
+            <a:xfrm>
+              <a:off x="631050" y="274025"/>
+              <a:ext cx="45075" cy="45100"/>
+            </a:xfrm>
+            <a:custGeom>
+              <a:avLst/>
+              <a:gdLst/>
+              <a:ahLst/>
+              <a:cxnLst/>
+              <a:rect l="l" t="t" r="r" b="b"/>
+              <a:pathLst>
+                <a:path w="1803" h="1804" fill="none" extrusionOk="0">
+                  <a:moveTo>
+                    <a:pt x="0" y="902"/>
+                  </a:moveTo>
+                  <a:lnTo>
+                    <a:pt x="0" y="902"/>
+                  </a:lnTo>
+                  <a:lnTo>
+                    <a:pt x="25" y="732"/>
+                  </a:lnTo>
+                  <a:lnTo>
+                    <a:pt x="73" y="561"/>
+                  </a:lnTo>
+                  <a:lnTo>
+                    <a:pt x="147" y="391"/>
+                  </a:lnTo>
+                  <a:lnTo>
+                    <a:pt x="268" y="269"/>
+                  </a:lnTo>
+                  <a:lnTo>
+                    <a:pt x="390" y="147"/>
+                  </a:lnTo>
+                  <a:lnTo>
+                    <a:pt x="561" y="74"/>
+                  </a:lnTo>
+                  <a:lnTo>
+                    <a:pt x="731" y="25"/>
+                  </a:lnTo>
+                  <a:lnTo>
+                    <a:pt x="902" y="1"/>
+                  </a:lnTo>
+                  <a:lnTo>
+                    <a:pt x="902" y="1"/>
+                  </a:lnTo>
+                  <a:lnTo>
+                    <a:pt x="1072" y="25"/>
+                  </a:lnTo>
+                  <a:lnTo>
+                    <a:pt x="1243" y="74"/>
+                  </a:lnTo>
+                  <a:lnTo>
+                    <a:pt x="1413" y="147"/>
+                  </a:lnTo>
+                  <a:lnTo>
+                    <a:pt x="1535" y="269"/>
+                  </a:lnTo>
+                  <a:lnTo>
+                    <a:pt x="1657" y="391"/>
+                  </a:lnTo>
+                  <a:lnTo>
+                    <a:pt x="1730" y="561"/>
+                  </a:lnTo>
+                  <a:lnTo>
+                    <a:pt x="1778" y="732"/>
+                  </a:lnTo>
+                  <a:lnTo>
+                    <a:pt x="1803" y="902"/>
+                  </a:lnTo>
+                  <a:lnTo>
+                    <a:pt x="1803" y="902"/>
+                  </a:lnTo>
+                  <a:lnTo>
+                    <a:pt x="1778" y="1073"/>
+                  </a:lnTo>
+                  <a:lnTo>
+                    <a:pt x="1730" y="1243"/>
+                  </a:lnTo>
+                  <a:lnTo>
+                    <a:pt x="1657" y="1414"/>
+                  </a:lnTo>
+                  <a:lnTo>
+                    <a:pt x="1535" y="1535"/>
+                  </a:lnTo>
+                  <a:lnTo>
+                    <a:pt x="1413" y="1657"/>
+                  </a:lnTo>
+                  <a:lnTo>
+                    <a:pt x="1243" y="1730"/>
+                  </a:lnTo>
+                  <a:lnTo>
+                    <a:pt x="1072" y="1779"/>
+                  </a:lnTo>
+                  <a:lnTo>
+                    <a:pt x="902" y="1803"/>
+                  </a:lnTo>
+                  <a:lnTo>
+                    <a:pt x="902" y="1803"/>
+                  </a:lnTo>
+                  <a:lnTo>
+                    <a:pt x="731" y="1779"/>
+                  </a:lnTo>
+                  <a:lnTo>
+                    <a:pt x="561" y="1730"/>
+                  </a:lnTo>
+                  <a:lnTo>
+                    <a:pt x="390" y="1657"/>
+                  </a:lnTo>
+                  <a:lnTo>
+                    <a:pt x="268" y="1535"/>
+                  </a:lnTo>
+                  <a:lnTo>
+                    <a:pt x="147" y="1414"/>
+                  </a:lnTo>
+                  <a:lnTo>
+                    <a:pt x="73" y="1243"/>
+                  </a:lnTo>
+                  <a:lnTo>
+                    <a:pt x="25" y="1073"/>
+                  </a:lnTo>
+                  <a:lnTo>
+                    <a:pt x="0" y="902"/>
+                  </a:lnTo>
+                  <a:lnTo>
+                    <a:pt x="0" y="902"/>
+                  </a:lnTo>
+                </a:path>
+              </a:pathLst>
+            </a:custGeom>
+            <a:noFill/>
+            <a:ln w="12175" cap="rnd" cmpd="sng">
+              <a:solidFill>
+                <a:srgbClr val="FF9800"/>
+              </a:solidFill>
+              <a:prstDash val="solid"/>
+              <a:round/>
+              <a:headEnd type="none" w="sm" len="sm"/>
+              <a:tailEnd type="none" w="sm" len="sm"/>
+            </a:ln>
+          </p:spPr>
+          <p:txBody>
+            <a:bodyPr spcFirstLastPara="1" wrap="square" lIns="91425" tIns="91425" rIns="91425" bIns="91425" anchor="ctr" anchorCtr="0">
+              <a:noAutofit/>
+            </a:bodyPr>
+            <a:lstStyle/>
+            <a:p>
+              <a:pPr marL="0" lvl="0" indent="0" algn="l" rtl="0">
+                <a:spcBef>
+                  <a:spcPts val="0"/>
+                </a:spcBef>
+                <a:spcAft>
+                  <a:spcPts val="0"/>
+                </a:spcAft>
+                <a:buNone/>
+              </a:pPr>
+              <a:endParaRPr/>
+            </a:p>
+          </p:txBody>
+        </p:sp>
+        <p:sp>
+          <p:nvSpPr>
+            <p:cNvPr id="200" name="Google Shape;200;p12"/>
+            <p:cNvSpPr/>
+            <p:nvPr/>
+          </p:nvSpPr>
+          <p:spPr>
+            <a:xfrm>
+              <a:off x="649925" y="590050"/>
+              <a:ext cx="133975" cy="25"/>
+            </a:xfrm>
+            <a:custGeom>
+              <a:avLst/>
+              <a:gdLst/>
+              <a:ahLst/>
+              <a:cxnLst/>
+              <a:rect l="l" t="t" r="r" b="b"/>
+              <a:pathLst>
+                <a:path w="5359" h="1" fill="none" extrusionOk="0">
+                  <a:moveTo>
+                    <a:pt x="5358" y="0"/>
+                  </a:moveTo>
+                  <a:lnTo>
+                    <a:pt x="0" y="0"/>
+                  </a:lnTo>
+                </a:path>
+              </a:pathLst>
+            </a:custGeom>
+            <a:noFill/>
+            <a:ln w="12175" cap="rnd" cmpd="sng">
+              <a:solidFill>
+                <a:srgbClr val="FF9800"/>
+              </a:solidFill>
+              <a:prstDash val="solid"/>
+              <a:round/>
+              <a:headEnd type="none" w="sm" len="sm"/>
+              <a:tailEnd type="none" w="sm" len="sm"/>
+            </a:ln>
+          </p:spPr>
+          <p:txBody>
+            <a:bodyPr spcFirstLastPara="1" wrap="square" lIns="91425" tIns="91425" rIns="91425" bIns="91425" anchor="ctr" anchorCtr="0">
+              <a:noAutofit/>
+            </a:bodyPr>
+            <a:lstStyle/>
+            <a:p>
+              <a:pPr marL="0" lvl="0" indent="0" algn="l" rtl="0">
+                <a:spcBef>
+                  <a:spcPts val="0"/>
+                </a:spcBef>
+                <a:spcAft>
+                  <a:spcPts val="0"/>
+                </a:spcAft>
+                <a:buNone/>
+              </a:pPr>
+              <a:endParaRPr/>
+            </a:p>
+          </p:txBody>
+        </p:sp>
+        <p:sp>
+          <p:nvSpPr>
+            <p:cNvPr id="201" name="Google Shape;201;p12"/>
+            <p:cNvSpPr/>
+            <p:nvPr/>
+          </p:nvSpPr>
+          <p:spPr>
+            <a:xfrm>
+              <a:off x="649925" y="534625"/>
+              <a:ext cx="255750" cy="25"/>
+            </a:xfrm>
+            <a:custGeom>
+              <a:avLst/>
+              <a:gdLst/>
+              <a:ahLst/>
+              <a:cxnLst/>
+              <a:rect l="l" t="t" r="r" b="b"/>
+              <a:pathLst>
+                <a:path w="10230" h="1" fill="none" extrusionOk="0">
+                  <a:moveTo>
+                    <a:pt x="10229" y="1"/>
+                  </a:moveTo>
+                  <a:lnTo>
+                    <a:pt x="0" y="1"/>
+                  </a:lnTo>
+                </a:path>
+              </a:pathLst>
+            </a:custGeom>
+            <a:noFill/>
+            <a:ln w="12175" cap="rnd" cmpd="sng">
+              <a:solidFill>
+                <a:srgbClr val="FF9800"/>
+              </a:solidFill>
+              <a:prstDash val="solid"/>
+              <a:round/>
+              <a:headEnd type="none" w="sm" len="sm"/>
+              <a:tailEnd type="none" w="sm" len="sm"/>
+            </a:ln>
+          </p:spPr>
+          <p:txBody>
+            <a:bodyPr spcFirstLastPara="1" wrap="square" lIns="91425" tIns="91425" rIns="91425" bIns="91425" anchor="ctr" anchorCtr="0">
+              <a:noAutofit/>
+            </a:bodyPr>
+            <a:lstStyle/>
+            <a:p>
+              <a:pPr marL="0" lvl="0" indent="0" algn="l" rtl="0">
+                <a:spcBef>
+                  <a:spcPts val="0"/>
+                </a:spcBef>
+                <a:spcAft>
+                  <a:spcPts val="0"/>
+                </a:spcAft>
+                <a:buNone/>
+              </a:pPr>
+              <a:endParaRPr/>
+            </a:p>
+          </p:txBody>
+        </p:sp>
+        <p:sp>
+          <p:nvSpPr>
+            <p:cNvPr id="202" name="Google Shape;202;p12"/>
+            <p:cNvSpPr/>
+            <p:nvPr/>
+          </p:nvSpPr>
+          <p:spPr>
+            <a:xfrm>
+              <a:off x="649925" y="479825"/>
+              <a:ext cx="255750" cy="25"/>
+            </a:xfrm>
+            <a:custGeom>
+              <a:avLst/>
+              <a:gdLst/>
+              <a:ahLst/>
+              <a:cxnLst/>
+              <a:rect l="l" t="t" r="r" b="b"/>
+              <a:pathLst>
+                <a:path w="10230" h="1" fill="none" extrusionOk="0">
+                  <a:moveTo>
+                    <a:pt x="10229" y="1"/>
+                  </a:moveTo>
+                  <a:lnTo>
+                    <a:pt x="0" y="1"/>
+                  </a:lnTo>
+                </a:path>
+              </a:pathLst>
+            </a:custGeom>
+            <a:noFill/>
+            <a:ln w="12175" cap="rnd" cmpd="sng">
+              <a:solidFill>
+                <a:srgbClr val="FF9800"/>
+              </a:solidFill>
+              <a:prstDash val="solid"/>
+              <a:round/>
+              <a:headEnd type="none" w="sm" len="sm"/>
+              <a:tailEnd type="none" w="sm" len="sm"/>
+            </a:ln>
+          </p:spPr>
+          <p:txBody>
+            <a:bodyPr spcFirstLastPara="1" wrap="square" lIns="91425" tIns="91425" rIns="91425" bIns="91425" anchor="ctr" anchorCtr="0">
+              <a:noAutofit/>
+            </a:bodyPr>
+            <a:lstStyle/>
+            <a:p>
+              <a:pPr marL="0" lvl="0" indent="0" algn="l" rtl="0">
+                <a:spcBef>
+                  <a:spcPts val="0"/>
+                </a:spcBef>
+                <a:spcAft>
+                  <a:spcPts val="0"/>
+                </a:spcAft>
+                <a:buNone/>
+              </a:pPr>
+              <a:endParaRPr/>
+            </a:p>
+          </p:txBody>
+        </p:sp>
+        <p:sp>
+          <p:nvSpPr>
+            <p:cNvPr id="203" name="Google Shape;203;p12"/>
+            <p:cNvSpPr/>
+            <p:nvPr/>
+          </p:nvSpPr>
+          <p:spPr>
+            <a:xfrm>
+              <a:off x="649925" y="424425"/>
+              <a:ext cx="255750" cy="25"/>
+            </a:xfrm>
+            <a:custGeom>
+              <a:avLst/>
+              <a:gdLst/>
+              <a:ahLst/>
+              <a:cxnLst/>
+              <a:rect l="l" t="t" r="r" b="b"/>
+              <a:pathLst>
+                <a:path w="10230" h="1" fill="none" extrusionOk="0">
+                  <a:moveTo>
+                    <a:pt x="10229" y="1"/>
+                  </a:moveTo>
+                  <a:lnTo>
+                    <a:pt x="0" y="1"/>
+                  </a:lnTo>
+                </a:path>
+              </a:pathLst>
+            </a:custGeom>
+            <a:noFill/>
+            <a:ln w="12175" cap="rnd" cmpd="sng">
+              <a:solidFill>
+                <a:srgbClr val="FF9800"/>
+              </a:solidFill>
+              <a:prstDash val="solid"/>
+              <a:round/>
+              <a:headEnd type="none" w="sm" len="sm"/>
+              <a:tailEnd type="none" w="sm" len="sm"/>
+            </a:ln>
+          </p:spPr>
+          <p:txBody>
+            <a:bodyPr spcFirstLastPara="1" wrap="square" lIns="91425" tIns="91425" rIns="91425" bIns="91425" anchor="ctr" anchorCtr="0">
+              <a:noAutofit/>
+            </a:bodyPr>
+            <a:lstStyle/>
+            <a:p>
+              <a:pPr marL="0" lvl="0" indent="0" algn="l" rtl="0">
+                <a:spcBef>
+                  <a:spcPts val="0"/>
+                </a:spcBef>
+                <a:spcAft>
+                  <a:spcPts val="0"/>
+                </a:spcAft>
+                <a:buNone/>
+              </a:pPr>
+              <a:endParaRPr/>
+            </a:p>
+          </p:txBody>
+        </p:sp>
+        <p:sp>
+          <p:nvSpPr>
+            <p:cNvPr id="204" name="Google Shape;204;p12"/>
+            <p:cNvSpPr/>
+            <p:nvPr/>
+          </p:nvSpPr>
+          <p:spPr>
+            <a:xfrm>
+              <a:off x="879475" y="274025"/>
+              <a:ext cx="45075" cy="45100"/>
+            </a:xfrm>
+            <a:custGeom>
+              <a:avLst/>
+              <a:gdLst/>
+              <a:ahLst/>
+              <a:cxnLst/>
+              <a:rect l="l" t="t" r="r" b="b"/>
+              <a:pathLst>
+                <a:path w="1803" h="1804" fill="none" extrusionOk="0">
+                  <a:moveTo>
+                    <a:pt x="901" y="1803"/>
+                  </a:moveTo>
+                  <a:lnTo>
+                    <a:pt x="901" y="1803"/>
+                  </a:lnTo>
+                  <a:lnTo>
+                    <a:pt x="731" y="1779"/>
+                  </a:lnTo>
+                  <a:lnTo>
+                    <a:pt x="560" y="1730"/>
+                  </a:lnTo>
+                  <a:lnTo>
+                    <a:pt x="390" y="1657"/>
+                  </a:lnTo>
+                  <a:lnTo>
+                    <a:pt x="268" y="1535"/>
+                  </a:lnTo>
+                  <a:lnTo>
+                    <a:pt x="146" y="1414"/>
+                  </a:lnTo>
+                  <a:lnTo>
+                    <a:pt x="73" y="1243"/>
+                  </a:lnTo>
+                  <a:lnTo>
+                    <a:pt x="25" y="1073"/>
+                  </a:lnTo>
+                  <a:lnTo>
+                    <a:pt x="0" y="902"/>
+                  </a:lnTo>
+                  <a:lnTo>
+                    <a:pt x="0" y="902"/>
+                  </a:lnTo>
+                  <a:lnTo>
+                    <a:pt x="25" y="732"/>
+                  </a:lnTo>
+                  <a:lnTo>
+                    <a:pt x="73" y="561"/>
+                  </a:lnTo>
+                  <a:lnTo>
+                    <a:pt x="146" y="391"/>
+                  </a:lnTo>
+                  <a:lnTo>
+                    <a:pt x="268" y="269"/>
+                  </a:lnTo>
+                  <a:lnTo>
+                    <a:pt x="390" y="147"/>
+                  </a:lnTo>
+                  <a:lnTo>
+                    <a:pt x="560" y="74"/>
+                  </a:lnTo>
+                  <a:lnTo>
+                    <a:pt x="731" y="25"/>
+                  </a:lnTo>
+                  <a:lnTo>
+                    <a:pt x="901" y="1"/>
+                  </a:lnTo>
+                  <a:lnTo>
+                    <a:pt x="901" y="1"/>
+                  </a:lnTo>
+                  <a:lnTo>
+                    <a:pt x="1072" y="25"/>
+                  </a:lnTo>
+                  <a:lnTo>
+                    <a:pt x="1242" y="74"/>
+                  </a:lnTo>
+                  <a:lnTo>
+                    <a:pt x="1413" y="147"/>
+                  </a:lnTo>
+                  <a:lnTo>
+                    <a:pt x="1535" y="269"/>
+                  </a:lnTo>
+                  <a:lnTo>
+                    <a:pt x="1656" y="391"/>
+                  </a:lnTo>
+                  <a:lnTo>
+                    <a:pt x="1729" y="561"/>
+                  </a:lnTo>
+                  <a:lnTo>
+                    <a:pt x="1778" y="732"/>
+                  </a:lnTo>
+                  <a:lnTo>
+                    <a:pt x="1802" y="902"/>
+                  </a:lnTo>
+                  <a:lnTo>
+                    <a:pt x="1802" y="902"/>
+                  </a:lnTo>
+                  <a:lnTo>
+                    <a:pt x="1778" y="1073"/>
+                  </a:lnTo>
+                  <a:lnTo>
+                    <a:pt x="1729" y="1243"/>
+                  </a:lnTo>
+                  <a:lnTo>
+                    <a:pt x="1656" y="1414"/>
+                  </a:lnTo>
+                  <a:lnTo>
+                    <a:pt x="1535" y="1535"/>
+                  </a:lnTo>
+                  <a:lnTo>
+                    <a:pt x="1413" y="1657"/>
+                  </a:lnTo>
+                  <a:lnTo>
+                    <a:pt x="1242" y="1730"/>
+                  </a:lnTo>
+                  <a:lnTo>
+                    <a:pt x="1072" y="1779"/>
+                  </a:lnTo>
+                  <a:lnTo>
+                    <a:pt x="901" y="1803"/>
+                  </a:lnTo>
+                  <a:lnTo>
+                    <a:pt x="901" y="1803"/>
+                  </a:lnTo>
+                </a:path>
+              </a:pathLst>
+            </a:custGeom>
+            <a:noFill/>
+            <a:ln w="12175" cap="rnd" cmpd="sng">
+              <a:solidFill>
+                <a:srgbClr val="FF9800"/>
+              </a:solidFill>
+              <a:prstDash val="solid"/>
+              <a:round/>
+              <a:headEnd type="none" w="sm" len="sm"/>
+              <a:tailEnd type="none" w="sm" len="sm"/>
+            </a:ln>
+          </p:spPr>
+          <p:txBody>
+            <a:bodyPr spcFirstLastPara="1" wrap="square" lIns="91425" tIns="91425" rIns="91425" bIns="91425" anchor="ctr" anchorCtr="0">
+              <a:noAutofit/>
+            </a:bodyPr>
+            <a:lstStyle/>
+            <a:p>
+              <a:pPr marL="0" lvl="0" indent="0" algn="l" rtl="0">
+                <a:spcBef>
+                  <a:spcPts val="0"/>
+                </a:spcBef>
+                <a:spcAft>
+                  <a:spcPts val="0"/>
+                </a:spcAft>
+                <a:buNone/>
+              </a:pPr>
+              <a:endParaRPr/>
+            </a:p>
+          </p:txBody>
+        </p:sp>
+        <p:sp>
+          <p:nvSpPr>
+            <p:cNvPr id="205" name="Google Shape;205;p12"/>
+            <p:cNvSpPr/>
+            <p:nvPr/>
+          </p:nvSpPr>
+          <p:spPr>
+            <a:xfrm>
+              <a:off x="654800" y="244200"/>
+              <a:ext cx="25" cy="51175"/>
+            </a:xfrm>
+            <a:custGeom>
+              <a:avLst/>
+              <a:gdLst/>
+              <a:ahLst/>
+              <a:cxnLst/>
+              <a:rect l="l" t="t" r="r" b="b"/>
+              <a:pathLst>
+                <a:path w="1" h="2047" fill="none" extrusionOk="0">
+                  <a:moveTo>
+                    <a:pt x="0" y="1"/>
+                  </a:moveTo>
+                  <a:lnTo>
+                    <a:pt x="0" y="2046"/>
+                  </a:lnTo>
+                </a:path>
+              </a:pathLst>
+            </a:custGeom>
+            <a:noFill/>
+            <a:ln w="12175" cap="rnd" cmpd="sng">
+              <a:solidFill>
+                <a:srgbClr val="FF9800"/>
+              </a:solidFill>
+              <a:prstDash val="solid"/>
+              <a:round/>
+              <a:headEnd type="none" w="sm" len="sm"/>
+              <a:tailEnd type="none" w="sm" len="sm"/>
+            </a:ln>
+          </p:spPr>
+          <p:txBody>
+            <a:bodyPr spcFirstLastPara="1" wrap="square" lIns="91425" tIns="91425" rIns="91425" bIns="91425" anchor="ctr" anchorCtr="0">
+              <a:noAutofit/>
+            </a:bodyPr>
+            <a:lstStyle/>
+            <a:p>
+              <a:pPr marL="0" lvl="0" indent="0" algn="l" rtl="0">
+                <a:spcBef>
+                  <a:spcPts val="0"/>
+                </a:spcBef>
+                <a:spcAft>
+                  <a:spcPts val="0"/>
+                </a:spcAft>
+                <a:buNone/>
+              </a:pPr>
+              <a:endParaRPr/>
+            </a:p>
+          </p:txBody>
+        </p:sp>
+        <p:sp>
+          <p:nvSpPr>
+            <p:cNvPr id="206" name="Google Shape;206;p12"/>
+            <p:cNvSpPr/>
+            <p:nvPr/>
+          </p:nvSpPr>
+          <p:spPr>
+            <a:xfrm>
+              <a:off x="737600" y="244200"/>
+              <a:ext cx="25" cy="51175"/>
+            </a:xfrm>
+            <a:custGeom>
+              <a:avLst/>
+              <a:gdLst/>
+              <a:ahLst/>
+              <a:cxnLst/>
+              <a:rect l="l" t="t" r="r" b="b"/>
+              <a:pathLst>
+                <a:path w="1" h="2047" fill="none" extrusionOk="0">
+                  <a:moveTo>
+                    <a:pt x="1" y="1"/>
+                  </a:moveTo>
+                  <a:lnTo>
+                    <a:pt x="1" y="2046"/>
+                  </a:lnTo>
+                </a:path>
+              </a:pathLst>
+            </a:custGeom>
+            <a:noFill/>
+            <a:ln w="12175" cap="rnd" cmpd="sng">
+              <a:solidFill>
+                <a:srgbClr val="FF9800"/>
+              </a:solidFill>
+              <a:prstDash val="solid"/>
+              <a:round/>
+              <a:headEnd type="none" w="sm" len="sm"/>
+              <a:tailEnd type="none" w="sm" len="sm"/>
+            </a:ln>
+          </p:spPr>
+          <p:txBody>
+            <a:bodyPr spcFirstLastPara="1" wrap="square" lIns="91425" tIns="91425" rIns="91425" bIns="91425" anchor="ctr" anchorCtr="0">
+              <a:noAutofit/>
+            </a:bodyPr>
+            <a:lstStyle/>
+            <a:p>
+              <a:pPr marL="0" lvl="0" indent="0" algn="l" rtl="0">
+                <a:spcBef>
+                  <a:spcPts val="0"/>
+                </a:spcBef>
+                <a:spcAft>
+                  <a:spcPts val="0"/>
+                </a:spcAft>
+                <a:buNone/>
+              </a:pPr>
+              <a:endParaRPr/>
+            </a:p>
+          </p:txBody>
+        </p:sp>
+        <p:sp>
+          <p:nvSpPr>
+            <p:cNvPr id="207" name="Google Shape;207;p12"/>
+            <p:cNvSpPr/>
+            <p:nvPr/>
+          </p:nvSpPr>
+          <p:spPr>
+            <a:xfrm>
+              <a:off x="820400" y="244200"/>
+              <a:ext cx="25" cy="51175"/>
+            </a:xfrm>
+            <a:custGeom>
+              <a:avLst/>
+              <a:gdLst/>
+              <a:ahLst/>
+              <a:cxnLst/>
+              <a:rect l="l" t="t" r="r" b="b"/>
+              <a:pathLst>
+                <a:path w="1" h="2047" fill="none" extrusionOk="0">
+                  <a:moveTo>
+                    <a:pt x="1" y="1"/>
+                  </a:moveTo>
+                  <a:lnTo>
+                    <a:pt x="1" y="2046"/>
+                  </a:lnTo>
+                </a:path>
+              </a:pathLst>
+            </a:custGeom>
+            <a:noFill/>
+            <a:ln w="12175" cap="rnd" cmpd="sng">
+              <a:solidFill>
+                <a:srgbClr val="FF9800"/>
+              </a:solidFill>
+              <a:prstDash val="solid"/>
+              <a:round/>
+              <a:headEnd type="none" w="sm" len="sm"/>
+              <a:tailEnd type="none" w="sm" len="sm"/>
+            </a:ln>
+          </p:spPr>
+          <p:txBody>
+            <a:bodyPr spcFirstLastPara="1" wrap="square" lIns="91425" tIns="91425" rIns="91425" bIns="91425" anchor="ctr" anchorCtr="0">
+              <a:noAutofit/>
+            </a:bodyPr>
+            <a:lstStyle/>
+            <a:p>
+              <a:pPr marL="0" lvl="0" indent="0" algn="l" rtl="0">
+                <a:spcBef>
+                  <a:spcPts val="0"/>
+                </a:spcBef>
+                <a:spcAft>
+                  <a:spcPts val="0"/>
+                </a:spcAft>
+                <a:buNone/>
+              </a:pPr>
+              <a:endParaRPr/>
+            </a:p>
+          </p:txBody>
+        </p:sp>
+        <p:sp>
+          <p:nvSpPr>
+            <p:cNvPr id="208" name="Google Shape;208;p12"/>
+            <p:cNvSpPr/>
+            <p:nvPr/>
+          </p:nvSpPr>
+          <p:spPr>
+            <a:xfrm>
+              <a:off x="903225" y="244200"/>
+              <a:ext cx="25" cy="51175"/>
+            </a:xfrm>
+            <a:custGeom>
+              <a:avLst/>
+              <a:gdLst/>
+              <a:ahLst/>
+              <a:cxnLst/>
+              <a:rect l="l" t="t" r="r" b="b"/>
+              <a:pathLst>
+                <a:path w="1" h="2047" fill="none" extrusionOk="0">
+                  <a:moveTo>
+                    <a:pt x="0" y="1"/>
+                  </a:moveTo>
+                  <a:lnTo>
+                    <a:pt x="0" y="2046"/>
+                  </a:lnTo>
+                </a:path>
+              </a:pathLst>
+            </a:custGeom>
+            <a:noFill/>
+            <a:ln w="12175" cap="rnd" cmpd="sng">
+              <a:solidFill>
+                <a:srgbClr val="FF9800"/>
+              </a:solidFill>
+              <a:prstDash val="solid"/>
+              <a:round/>
+              <a:headEnd type="none" w="sm" len="sm"/>
+              <a:tailEnd type="none" w="sm" len="sm"/>
+            </a:ln>
+          </p:spPr>
+          <p:txBody>
+            <a:bodyPr spcFirstLastPara="1" wrap="square" lIns="91425" tIns="91425" rIns="91425" bIns="91425" anchor="ctr" anchorCtr="0">
+              <a:noAutofit/>
+            </a:bodyPr>
+            <a:lstStyle/>
+            <a:p>
+              <a:pPr marL="0" lvl="0" indent="0" algn="l" rtl="0">
+                <a:spcBef>
+                  <a:spcPts val="0"/>
+                </a:spcBef>
+                <a:spcAft>
+                  <a:spcPts val="0"/>
+                </a:spcAft>
+                <a:buNone/>
+              </a:pPr>
+              <a:endParaRPr/>
+            </a:p>
+          </p:txBody>
+        </p:sp>
+      </p:grpSp>
       <p:pic>
         <p:nvPicPr>
-          <p:cNvPr id="1026" name="Picture 2">
+          <p:cNvPr id="2" name="Picture 2">
+            <a:hlinkClick r:id="rId7"/>
             <a:extLst>
               <a:ext uri="{FF2B5EF4-FFF2-40B4-BE49-F238E27FC236}">
-                <a16:creationId xmlns:a16="http://schemas.microsoft.com/office/drawing/2014/main" id="{C1B21C9E-54D1-4A50-AB87-69734BCE8B20}"/>
+                <a16:creationId xmlns:a16="http://schemas.microsoft.com/office/drawing/2014/main" id="{5F12B6FC-C828-6DFD-030E-E61AD5A6FC45}"/>
               </a:ext>
             </a:extLst>
           </p:cNvPr>
@@ -13696,7 +15490,7 @@
           <p:nvPr/>
         </p:nvPicPr>
         <p:blipFill>
-          <a:blip r:embed="rId11">
+          <a:blip r:embed="rId8">
             <a:extLst>
               <a:ext uri="{28A0092B-C50C-407E-A947-70E740481C1C}">
                 <a14:useLocalDpi xmlns:a14="http://schemas.microsoft.com/office/drawing/2010/main" val="0"/>
@@ -13710,8 +15504,8 @@
         </p:blipFill>
         <p:spPr bwMode="auto">
           <a:xfrm>
-            <a:off x="0" y="4293643"/>
-            <a:ext cx="1274786" cy="849857"/>
+            <a:off x="358733" y="1710392"/>
+            <a:ext cx="3577357" cy="1589315"/>
           </a:xfrm>
           <a:prstGeom prst="rect">
             <a:avLst/>
@@ -13729,6 +15523,11 @@
         </p:spPr>
       </p:pic>
     </p:spTree>
+    <p:extLst>
+      <p:ext uri="{BB962C8B-B14F-4D97-AF65-F5344CB8AC3E}">
+        <p14:creationId xmlns:p14="http://schemas.microsoft.com/office/powerpoint/2010/main" val="1523791441"/>
+      </p:ext>
+    </p:extLst>
   </p:cSld>
   <p:clrMapOvr>
     <a:masterClrMapping/>
@@ -13736,7 +15535,7 @@
 </p:sld>
 </file>
 
-<file path=ppt/slides/slide10.xml><?xml version="1.0" encoding="utf-8"?>
+<file path=ppt/slides/slide11.xml><?xml version="1.0" encoding="utf-8"?>
 <p:sld xmlns:a="http://schemas.openxmlformats.org/drawingml/2006/main" xmlns:r="http://schemas.openxmlformats.org/officeDocument/2006/relationships" xmlns:p="http://schemas.openxmlformats.org/presentationml/2006/main" show="0">
   <p:cSld>
     <p:spTree>
@@ -14230,7 +16029,7 @@
             <a:pPr rtl="0"/>
             <a:fld id="{9CD8D479-8942-46E8-A226-A4E01F7A105C}" type="slidenum">
               <a:rPr lang="pt-BR" noProof="0" smtClean="0"/>
-              <a:t>10</a:t>
+              <a:t>11</a:t>
             </a:fld>
             <a:endParaRPr lang="pt-BR" noProof="0" dirty="0"/>
           </a:p>
@@ -14260,7 +16059,7 @@
             <a:pPr rtl="0"/>
             <a:fld id="{84DDBE4A-42CF-4B09-9FBC-B0B9834A4DCD}" type="datetime1">
               <a:rPr lang="pt-BR" noProof="0" smtClean="0"/>
-              <a:t>12/09/2023</a:t>
+              <a:t>01/10/2023</a:t>
             </a:fld>
             <a:endParaRPr lang="pt-BR" noProof="0" dirty="0"/>
           </a:p>
@@ -14321,11 +16120,7 @@
           <a:p>
             <a:r>
               <a:rPr lang="pt-BR" sz="3200" b="1" dirty="0"/>
-              <a:t>Exemplos de </a:t>
-            </a:r>
-            <a:r>
-              <a:rPr lang="pt-BR" sz="3200" b="1"/>
-              <a:t>aplicação – Parte 2</a:t>
+              <a:t>Exemplos de aplicação – Parte 2</a:t>
             </a:r>
             <a:endParaRPr lang="pt-BR" dirty="0"/>
           </a:p>
@@ -18530,13 +20325,16 @@
               </a:rPr>
               <a:t>Source</a:t>
             </a:r>
-            <a:endParaRPr lang="pt-BR" sz="1600" b="0" i="0" dirty="0">
-              <a:solidFill>
-                <a:srgbClr val="202122"/>
-              </a:solidFill>
-              <a:effectLst/>
-              <a:latin typeface="Arial" panose="020B0604020202020204" pitchFamily="34" charset="0"/>
-            </a:endParaRPr>
+            <a:r>
+              <a:rPr lang="pt-BR" sz="1600" b="0" i="0" dirty="0">
+                <a:solidFill>
+                  <a:srgbClr val="202122"/>
+                </a:solidFill>
+                <a:effectLst/>
+                <a:latin typeface="Arial" panose="020B0604020202020204" pitchFamily="34" charset="0"/>
+              </a:rPr>
+              <a:t> (código aberto)</a:t>
+            </a:r>
           </a:p>
           <a:p>
             <a:pPr marL="457200" lvl="0" indent="-381000" algn="l" rtl="0">
@@ -24787,6 +26585,9 @@
             </a:pPr>
             <a:r>
               <a:rPr lang="pt-BR" sz="1600" dirty="0">
+                <a:solidFill>
+                  <a:schemeClr val="tx1"/>
+                </a:solidFill>
                 <a:latin typeface="+mj-lt"/>
                 <a:hlinkClick r:id="rId3">
                   <a:extLst>
@@ -24799,6 +26600,9 @@
               <a:t>Variáveis e Representação dos dados</a:t>
             </a:r>
             <a:endParaRPr lang="pt-BR" sz="1600" dirty="0">
+              <a:solidFill>
+                <a:schemeClr val="tx1"/>
+              </a:solidFill>
               <a:latin typeface="+mj-lt"/>
             </a:endParaRPr>
           </a:p>
@@ -24810,12 +26614,24 @@
             </a:pPr>
             <a:r>
               <a:rPr lang="pt-BR" sz="1600" dirty="0">
+                <a:solidFill>
+                  <a:schemeClr val="tx1"/>
+                </a:solidFill>
                 <a:latin typeface="+mj-lt"/>
-                <a:hlinkClick r:id="rId4"/>
+                <a:hlinkClick r:id="rId4">
+                  <a:extLst>
+                    <a:ext uri="{A12FA001-AC4F-418D-AE19-62706E023703}">
+                      <ahyp:hlinkClr xmlns:ahyp="http://schemas.microsoft.com/office/drawing/2018/hyperlinkcolor" val="tx"/>
+                    </a:ext>
+                  </a:extLst>
+                </a:hlinkClick>
               </a:rPr>
               <a:t>Variáveis: primitivas e derivadas</a:t>
             </a:r>
             <a:endParaRPr lang="pt-BR" sz="1600" dirty="0">
+              <a:solidFill>
+                <a:schemeClr val="tx1"/>
+              </a:solidFill>
               <a:latin typeface="+mj-lt"/>
             </a:endParaRPr>
           </a:p>
@@ -24827,6 +26643,9 @@
             </a:pPr>
             <a:r>
               <a:rPr lang="pt-BR" sz="1600" dirty="0">
+                <a:solidFill>
+                  <a:schemeClr val="tx1"/>
+                </a:solidFill>
                 <a:latin typeface="+mj-lt"/>
                 <a:hlinkClick r:id="rId5">
                   <a:extLst>
@@ -24836,9 +26655,12 @@
                   </a:extLst>
                 </a:hlinkClick>
               </a:rPr>
-              <a:t>Dados Geográficos</a:t>
+              <a:t>Dados Tabulares</a:t>
             </a:r>
             <a:endParaRPr lang="pt-BR" sz="1600" dirty="0">
+              <a:solidFill>
+                <a:schemeClr val="tx1"/>
+              </a:solidFill>
               <a:latin typeface="+mj-lt"/>
             </a:endParaRPr>
           </a:p>
@@ -24850,83 +26672,64 @@
             </a:pPr>
             <a:r>
               <a:rPr lang="pt-BR" sz="1600" dirty="0">
+                <a:solidFill>
+                  <a:schemeClr val="tx1"/>
+                </a:solidFill>
                 <a:latin typeface="+mj-lt"/>
                 <a:hlinkClick r:id="rId6"/>
               </a:rPr>
-              <a:t>Dados Tabulares</a:t>
+              <a:t>Dados Geográficos:</a:t>
             </a:r>
             <a:endParaRPr lang="pt-BR" sz="1600" dirty="0">
+              <a:solidFill>
+                <a:schemeClr val="tx1"/>
+              </a:solidFill>
               <a:latin typeface="+mj-lt"/>
             </a:endParaRPr>
           </a:p>
           <a:p>
-            <a:pPr>
+            <a:pPr lvl="1">
               <a:lnSpc>
                 <a:spcPct val="150000"/>
               </a:lnSpc>
             </a:pPr>
             <a:r>
               <a:rPr lang="pt-BR" sz="1600" dirty="0">
+                <a:solidFill>
+                  <a:schemeClr val="tx1"/>
+                </a:solidFill>
                 <a:latin typeface="+mj-lt"/>
-                <a:hlinkClick r:id="rId7"/>
+                <a:hlinkClick r:id="rId6"/>
               </a:rPr>
-              <a:t>Download de Dados IBGE</a:t>
+              <a:t>Representações Vetoriais 1/2</a:t>
             </a:r>
             <a:endParaRPr lang="pt-BR" sz="1600" dirty="0">
+              <a:solidFill>
+                <a:schemeClr val="tx1"/>
+              </a:solidFill>
               <a:latin typeface="+mj-lt"/>
             </a:endParaRPr>
           </a:p>
           <a:p>
-            <a:pPr>
+            <a:pPr lvl="1">
               <a:lnSpc>
                 <a:spcPct val="150000"/>
               </a:lnSpc>
             </a:pPr>
             <a:r>
               <a:rPr lang="pt-BR" sz="1600" dirty="0">
+                <a:solidFill>
+                  <a:schemeClr val="tx1"/>
+                </a:solidFill>
                 <a:latin typeface="+mj-lt"/>
-                <a:hlinkClick r:id="rId8"/>
+                <a:hlinkClick r:id="rId7"/>
               </a:rPr>
-              <a:t>Dados de satélite</a:t>
+              <a:t>Representações Vetoriais 2/2</a:t>
             </a:r>
             <a:endParaRPr lang="pt-BR" sz="1600" dirty="0">
-              <a:latin typeface="+mj-lt"/>
-            </a:endParaRPr>
-          </a:p>
-          <a:p>
-            <a:pPr>
-              <a:lnSpc>
-                <a:spcPct val="150000"/>
-              </a:lnSpc>
-            </a:pPr>
-            <a:r>
-              <a:rPr lang="pt-BR" sz="1600" dirty="0">
-                <a:latin typeface="+mj-lt"/>
-                <a:hlinkClick r:id="rId9"/>
-              </a:rPr>
-              <a:t>Projetos (</a:t>
-            </a:r>
-            <a:r>
-              <a:rPr lang="pt-BR" sz="1600" dirty="0" err="1">
-                <a:latin typeface="+mj-lt"/>
-                <a:hlinkClick r:id="rId9"/>
-              </a:rPr>
-              <a:t>SR</a:t>
-            </a:r>
-            <a:r>
-              <a:rPr lang="pt-BR" sz="1600" dirty="0">
-                <a:latin typeface="+mj-lt"/>
-                <a:hlinkClick r:id="rId9"/>
-              </a:rPr>
-              <a:t> Clima)</a:t>
-            </a:r>
-            <a:endParaRPr lang="pt-BR" sz="1600" dirty="0">
-              <a:latin typeface="+mj-lt"/>
-            </a:endParaRPr>
-          </a:p>
-          <a:p>
-            <a:pPr lvl="1"/>
-            <a:endParaRPr lang="pt-BR" sz="1600" dirty="0">
+              <a:solidFill>
+                <a:schemeClr val="tx1"/>
+              </a:solidFill>
               <a:latin typeface="+mj-lt"/>
             </a:endParaRPr>
           </a:p>
@@ -26488,7 +28291,7 @@
       <p:pic>
         <p:nvPicPr>
           <p:cNvPr id="2" name="Picture 2">
-            <a:hlinkClick r:id="rId10"/>
+            <a:hlinkClick r:id="rId8"/>
             <a:extLst>
               <a:ext uri="{FF2B5EF4-FFF2-40B4-BE49-F238E27FC236}">
                 <a16:creationId xmlns:a16="http://schemas.microsoft.com/office/drawing/2014/main" id="{5F12B6FC-C828-6DFD-030E-E61AD5A6FC45}"/>
@@ -26501,7 +28304,7 @@
           <p:nvPr/>
         </p:nvPicPr>
         <p:blipFill>
-          <a:blip r:embed="rId11">
+          <a:blip r:embed="rId9">
             <a:extLst>
               <a:ext uri="{28A0092B-C50C-407E-A947-70E740481C1C}">
                 <a14:useLocalDpi xmlns:a14="http://schemas.microsoft.com/office/drawing/2010/main" val="0"/>

</xml_diff>